<commit_message>
crud afsluitende opdrachten en spellcheck
</commit_message>
<xml_diff>
--- a/sql/img/SQLcompact_afbeeldingen.pptx
+++ b/sql/img/SQLcompact_afbeeldingen.pptx
@@ -8,6 +8,7 @@
     <p:sldId id="256" r:id="rId2"/>
     <p:sldId id="258" r:id="rId3"/>
     <p:sldId id="257" r:id="rId4"/>
+    <p:sldId id="259" r:id="rId5"/>
   </p:sldIdLst>
   <p:sldSz cx="12192000" cy="6858000"/>
   <p:notesSz cx="6858000" cy="9144000"/>
@@ -274,7 +275,7 @@
           <a:p>
             <a:fld id="{A16C4B6E-B458-49AB-B465-122E3E427539}" type="datetimeFigureOut">
               <a:rPr lang="en-US" smtClean="0"/>
-              <a:t>29-Jul-25</a:t>
+              <a:t>30-Jul-25</a:t>
             </a:fld>
             <a:endParaRPr lang="en-US"/>
           </a:p>
@@ -474,7 +475,7 @@
           <a:p>
             <a:fld id="{A16C4B6E-B458-49AB-B465-122E3E427539}" type="datetimeFigureOut">
               <a:rPr lang="en-US" smtClean="0"/>
-              <a:t>29-Jul-25</a:t>
+              <a:t>30-Jul-25</a:t>
             </a:fld>
             <a:endParaRPr lang="en-US"/>
           </a:p>
@@ -684,7 +685,7 @@
           <a:p>
             <a:fld id="{A16C4B6E-B458-49AB-B465-122E3E427539}" type="datetimeFigureOut">
               <a:rPr lang="en-US" smtClean="0"/>
-              <a:t>29-Jul-25</a:t>
+              <a:t>30-Jul-25</a:t>
             </a:fld>
             <a:endParaRPr lang="en-US"/>
           </a:p>
@@ -884,7 +885,7 @@
           <a:p>
             <a:fld id="{A16C4B6E-B458-49AB-B465-122E3E427539}" type="datetimeFigureOut">
               <a:rPr lang="en-US" smtClean="0"/>
-              <a:t>29-Jul-25</a:t>
+              <a:t>30-Jul-25</a:t>
             </a:fld>
             <a:endParaRPr lang="en-US"/>
           </a:p>
@@ -1160,7 +1161,7 @@
           <a:p>
             <a:fld id="{A16C4B6E-B458-49AB-B465-122E3E427539}" type="datetimeFigureOut">
               <a:rPr lang="en-US" smtClean="0"/>
-              <a:t>29-Jul-25</a:t>
+              <a:t>30-Jul-25</a:t>
             </a:fld>
             <a:endParaRPr lang="en-US"/>
           </a:p>
@@ -1428,7 +1429,7 @@
           <a:p>
             <a:fld id="{A16C4B6E-B458-49AB-B465-122E3E427539}" type="datetimeFigureOut">
               <a:rPr lang="en-US" smtClean="0"/>
-              <a:t>29-Jul-25</a:t>
+              <a:t>30-Jul-25</a:t>
             </a:fld>
             <a:endParaRPr lang="en-US"/>
           </a:p>
@@ -1843,7 +1844,7 @@
           <a:p>
             <a:fld id="{A16C4B6E-B458-49AB-B465-122E3E427539}" type="datetimeFigureOut">
               <a:rPr lang="en-US" smtClean="0"/>
-              <a:t>29-Jul-25</a:t>
+              <a:t>30-Jul-25</a:t>
             </a:fld>
             <a:endParaRPr lang="en-US"/>
           </a:p>
@@ -1985,7 +1986,7 @@
           <a:p>
             <a:fld id="{A16C4B6E-B458-49AB-B465-122E3E427539}" type="datetimeFigureOut">
               <a:rPr lang="en-US" smtClean="0"/>
-              <a:t>29-Jul-25</a:t>
+              <a:t>30-Jul-25</a:t>
             </a:fld>
             <a:endParaRPr lang="en-US"/>
           </a:p>
@@ -2098,7 +2099,7 @@
           <a:p>
             <a:fld id="{A16C4B6E-B458-49AB-B465-122E3E427539}" type="datetimeFigureOut">
               <a:rPr lang="en-US" smtClean="0"/>
-              <a:t>29-Jul-25</a:t>
+              <a:t>30-Jul-25</a:t>
             </a:fld>
             <a:endParaRPr lang="en-US"/>
           </a:p>
@@ -2411,7 +2412,7 @@
           <a:p>
             <a:fld id="{A16C4B6E-B458-49AB-B465-122E3E427539}" type="datetimeFigureOut">
               <a:rPr lang="en-US" smtClean="0"/>
-              <a:t>29-Jul-25</a:t>
+              <a:t>30-Jul-25</a:t>
             </a:fld>
             <a:endParaRPr lang="en-US"/>
           </a:p>
@@ -2700,7 +2701,7 @@
           <a:p>
             <a:fld id="{A16C4B6E-B458-49AB-B465-122E3E427539}" type="datetimeFigureOut">
               <a:rPr lang="en-US" smtClean="0"/>
-              <a:t>29-Jul-25</a:t>
+              <a:t>30-Jul-25</a:t>
             </a:fld>
             <a:endParaRPr lang="en-US"/>
           </a:p>
@@ -2943,7 +2944,7 @@
           <a:p>
             <a:fld id="{A16C4B6E-B458-49AB-B465-122E3E427539}" type="datetimeFigureOut">
               <a:rPr lang="en-US" smtClean="0"/>
-              <a:t>29-Jul-25</a:t>
+              <a:t>30-Jul-25</a:t>
             </a:fld>
             <a:endParaRPr lang="en-US"/>
           </a:p>
@@ -4702,6 +4703,127 @@
 </p:sld>
 </file>
 
+<file path=ppt/slides/slide4.xml><?xml version="1.0" encoding="utf-8"?>
+<p:sld xmlns:a="http://schemas.openxmlformats.org/drawingml/2006/main" xmlns:r="http://schemas.openxmlformats.org/officeDocument/2006/relationships" xmlns:p="http://schemas.openxmlformats.org/presentationml/2006/main">
+  <p:cSld>
+    <p:spTree>
+      <p:nvGrpSpPr>
+        <p:cNvPr id="1" name=""/>
+        <p:cNvGrpSpPr/>
+        <p:nvPr/>
+      </p:nvGrpSpPr>
+      <p:grpSpPr>
+        <a:xfrm>
+          <a:off x="0" y="0"/>
+          <a:ext cx="0" cy="0"/>
+          <a:chOff x="0" y="0"/>
+          <a:chExt cx="0" cy="0"/>
+        </a:xfrm>
+      </p:grpSpPr>
+      <p:pic>
+        <p:nvPicPr>
+          <p:cNvPr id="3" name="Afbeelding 2" descr="Afbeelding met tekst, schermopname, nummer, diagram&#10;&#10;Door AI gegenereerde inhoud is mogelijk onjuist.">
+            <a:extLst>
+              <a:ext uri="{FF2B5EF4-FFF2-40B4-BE49-F238E27FC236}">
+                <a16:creationId xmlns:a16="http://schemas.microsoft.com/office/drawing/2014/main" id="{104018BD-1166-1843-4C81-1CAE51C771B6}"/>
+              </a:ext>
+            </a:extLst>
+          </p:cNvPr>
+          <p:cNvPicPr>
+            <a:picLocks noChangeAspect="1"/>
+          </p:cNvPicPr>
+          <p:nvPr/>
+        </p:nvPicPr>
+        <p:blipFill>
+          <a:blip r:embed="rId2">
+            <a:extLst>
+              <a:ext uri="{28A0092B-C50C-407E-A947-70E740481C1C}">
+                <a14:useLocalDpi xmlns:a14="http://schemas.microsoft.com/office/drawing/2010/main" val="0"/>
+              </a:ext>
+            </a:extLst>
+          </a:blip>
+          <a:srcRect l="25000" t="25931" r="28387" b="16916"/>
+          <a:stretch>
+            <a:fillRect/>
+          </a:stretch>
+        </p:blipFill>
+        <p:spPr>
+          <a:xfrm>
+            <a:off x="3048000" y="1818968"/>
+            <a:ext cx="5683045" cy="3823076"/>
+          </a:xfrm>
+          <a:prstGeom prst="rect">
+            <a:avLst/>
+          </a:prstGeom>
+        </p:spPr>
+      </p:pic>
+      <p:sp>
+        <p:nvSpPr>
+          <p:cNvPr id="4" name="Rechthoek 3">
+            <a:extLst>
+              <a:ext uri="{FF2B5EF4-FFF2-40B4-BE49-F238E27FC236}">
+                <a16:creationId xmlns:a16="http://schemas.microsoft.com/office/drawing/2014/main" id="{A468BF87-5301-37CE-725F-C53C15BD055D}"/>
+              </a:ext>
+            </a:extLst>
+          </p:cNvPr>
+          <p:cNvSpPr/>
+          <p:nvPr/>
+        </p:nvSpPr>
+        <p:spPr>
+          <a:xfrm>
+            <a:off x="5532120" y="4640580"/>
+            <a:ext cx="3198925" cy="1001464"/>
+          </a:xfrm>
+          <a:prstGeom prst="rect">
+            <a:avLst/>
+          </a:prstGeom>
+          <a:solidFill>
+            <a:schemeClr val="bg1"/>
+          </a:solidFill>
+          <a:ln>
+            <a:solidFill>
+              <a:schemeClr val="bg1"/>
+            </a:solidFill>
+          </a:ln>
+        </p:spPr>
+        <p:style>
+          <a:lnRef idx="2">
+            <a:schemeClr val="accent1">
+              <a:shade val="15000"/>
+            </a:schemeClr>
+          </a:lnRef>
+          <a:fillRef idx="1">
+            <a:schemeClr val="accent1"/>
+          </a:fillRef>
+          <a:effectRef idx="0">
+            <a:schemeClr val="accent1"/>
+          </a:effectRef>
+          <a:fontRef idx="minor">
+            <a:schemeClr val="lt1"/>
+          </a:fontRef>
+        </p:style>
+        <p:txBody>
+          <a:bodyPr rtlCol="0" anchor="ctr"/>
+          <a:lstStyle/>
+          <a:p>
+            <a:pPr algn="ctr"/>
+            <a:endParaRPr lang="en-US"/>
+          </a:p>
+        </p:txBody>
+      </p:sp>
+    </p:spTree>
+    <p:extLst>
+      <p:ext uri="{BB962C8B-B14F-4D97-AF65-F5344CB8AC3E}">
+        <p14:creationId xmlns:p14="http://schemas.microsoft.com/office/powerpoint/2010/main" val="1430308620"/>
+      </p:ext>
+    </p:extLst>
+  </p:cSld>
+  <p:clrMapOvr>
+    <a:masterClrMapping/>
+  </p:clrMapOvr>
+</p:sld>
+</file>
+
 <file path=ppt/theme/theme1.xml><?xml version="1.0" encoding="utf-8"?>
 <a:theme xmlns:a="http://schemas.openxmlformats.org/drawingml/2006/main" name="Kantoorthema">
   <a:themeElements>

</xml_diff>